<commit_message>
fixed a parameter on a slide
</commit_message>
<xml_diff>
--- a/2020-02-10 - Mississippi PS UG - Module Building Modules/MSPSUG - Module Building Modules.pptx
+++ b/2020-02-10 - Mississippi PS UG - Module Building Modules/MSPSUG - Module Building Modules.pptx
@@ -4093,7 +4093,15 @@
             </a:r>
             <a:r>
               <a:rPr lang="en-US" dirty="0"/>
-              <a:t>’ –Path .\docs</a:t>
+              <a:t>’ –</a:t>
+            </a:r>
+            <a:r>
+              <a:rPr lang="en-US"/>
+              <a:t>OutputFolder </a:t>
+            </a:r>
+            <a:r>
+              <a:rPr lang="en-US" dirty="0"/>
+              <a:t>.\docs</a:t>
             </a:r>
           </a:p>
           <a:p>

</xml_diff>

<commit_message>
small update after test
</commit_message>
<xml_diff>
--- a/2020-02-10 - Mississippi PS UG - Module Building Modules/MSPSUG - Module Building Modules.pptx
+++ b/2020-02-10 - Mississippi PS UG - Module Building Modules/MSPSUG - Module Building Modules.pptx
@@ -287,7 +287,7 @@
           <a:p>
             <a:fld id="{D46B952B-F692-4DD1-9678-FCDA40C3FC40}" type="datetimeFigureOut">
               <a:rPr lang="en-US" smtClean="0"/>
-              <a:t>2/7/2020</a:t>
+              <a:t>2/10/2020</a:t>
             </a:fld>
             <a:endParaRPr lang="en-US"/>
           </a:p>
@@ -485,7 +485,7 @@
           <a:p>
             <a:fld id="{D46B952B-F692-4DD1-9678-FCDA40C3FC40}" type="datetimeFigureOut">
               <a:rPr lang="en-US" smtClean="0"/>
-              <a:t>2/7/2020</a:t>
+              <a:t>2/10/2020</a:t>
             </a:fld>
             <a:endParaRPr lang="en-US"/>
           </a:p>
@@ -693,7 +693,7 @@
           <a:p>
             <a:fld id="{D46B952B-F692-4DD1-9678-FCDA40C3FC40}" type="datetimeFigureOut">
               <a:rPr lang="en-US" smtClean="0"/>
-              <a:t>2/7/2020</a:t>
+              <a:t>2/10/2020</a:t>
             </a:fld>
             <a:endParaRPr lang="en-US"/>
           </a:p>
@@ -891,7 +891,7 @@
           <a:p>
             <a:fld id="{D46B952B-F692-4DD1-9678-FCDA40C3FC40}" type="datetimeFigureOut">
               <a:rPr lang="en-US" smtClean="0"/>
-              <a:t>2/7/2020</a:t>
+              <a:t>2/10/2020</a:t>
             </a:fld>
             <a:endParaRPr lang="en-US"/>
           </a:p>
@@ -1166,7 +1166,7 @@
           <a:p>
             <a:fld id="{D46B952B-F692-4DD1-9678-FCDA40C3FC40}" type="datetimeFigureOut">
               <a:rPr lang="en-US" smtClean="0"/>
-              <a:t>2/7/2020</a:t>
+              <a:t>2/10/2020</a:t>
             </a:fld>
             <a:endParaRPr lang="en-US"/>
           </a:p>
@@ -1431,7 +1431,7 @@
           <a:p>
             <a:fld id="{D46B952B-F692-4DD1-9678-FCDA40C3FC40}" type="datetimeFigureOut">
               <a:rPr lang="en-US" smtClean="0"/>
-              <a:t>2/7/2020</a:t>
+              <a:t>2/10/2020</a:t>
             </a:fld>
             <a:endParaRPr lang="en-US"/>
           </a:p>
@@ -1843,7 +1843,7 @@
           <a:p>
             <a:fld id="{D46B952B-F692-4DD1-9678-FCDA40C3FC40}" type="datetimeFigureOut">
               <a:rPr lang="en-US" smtClean="0"/>
-              <a:t>2/7/2020</a:t>
+              <a:t>2/10/2020</a:t>
             </a:fld>
             <a:endParaRPr lang="en-US"/>
           </a:p>
@@ -1984,7 +1984,7 @@
           <a:p>
             <a:fld id="{D46B952B-F692-4DD1-9678-FCDA40C3FC40}" type="datetimeFigureOut">
               <a:rPr lang="en-US" smtClean="0"/>
-              <a:t>2/7/2020</a:t>
+              <a:t>2/10/2020</a:t>
             </a:fld>
             <a:endParaRPr lang="en-US"/>
           </a:p>
@@ -2097,7 +2097,7 @@
           <a:p>
             <a:fld id="{D46B952B-F692-4DD1-9678-FCDA40C3FC40}" type="datetimeFigureOut">
               <a:rPr lang="en-US" smtClean="0"/>
-              <a:t>2/7/2020</a:t>
+              <a:t>2/10/2020</a:t>
             </a:fld>
             <a:endParaRPr lang="en-US"/>
           </a:p>
@@ -2408,7 +2408,7 @@
           <a:p>
             <a:fld id="{D46B952B-F692-4DD1-9678-FCDA40C3FC40}" type="datetimeFigureOut">
               <a:rPr lang="en-US" smtClean="0"/>
-              <a:t>2/7/2020</a:t>
+              <a:t>2/10/2020</a:t>
             </a:fld>
             <a:endParaRPr lang="en-US"/>
           </a:p>
@@ -2696,7 +2696,7 @@
           <a:p>
             <a:fld id="{D46B952B-F692-4DD1-9678-FCDA40C3FC40}" type="datetimeFigureOut">
               <a:rPr lang="en-US" smtClean="0"/>
-              <a:t>2/7/2020</a:t>
+              <a:t>2/10/2020</a:t>
             </a:fld>
             <a:endParaRPr lang="en-US"/>
           </a:p>
@@ -2946,7 +2946,7 @@
           <a:p>
             <a:fld id="{D46B952B-F692-4DD1-9678-FCDA40C3FC40}" type="datetimeFigureOut">
               <a:rPr lang="en-US" smtClean="0"/>
-              <a:t>2/7/2020</a:t>
+              <a:t>2/10/2020</a:t>
             </a:fld>
             <a:endParaRPr lang="en-US"/>
           </a:p>
@@ -4680,7 +4680,7 @@
             <a:pPr lvl="1"/>
             <a:r>
               <a:rPr lang="en-US" dirty="0"/>
-              <a:t>From Eugene,  so I like to bike, eat granola, and grow out my beard</a:t>
+              <a:t>From Eugene, OR (USA) so I like to bike, eat granola, and grow out my beard</a:t>
             </a:r>
           </a:p>
           <a:p>

</xml_diff>